<commit_message>
Adding load balanced Fargate service Terraform
</commit_message>
<xml_diff>
--- a/pattern/amazon-ecs-cluster-with-terraform/diagram.pptx
+++ b/pattern/amazon-ecs-cluster-with-terraform/diagram.pptx
@@ -259,7 +259,7 @@
           <a:p>
             <a:fld id="{55F0E5CF-1040-4245-9F91-D18CDDA0757F}" type="datetimeFigureOut">
               <a:rPr lang="en-US" smtClean="0"/>
-              <a:t>5/18/23</a:t>
+              <a:t>5/22/23</a:t>
             </a:fld>
             <a:endParaRPr lang="en-US"/>
           </a:p>
@@ -457,7 +457,7 @@
           <a:p>
             <a:fld id="{55F0E5CF-1040-4245-9F91-D18CDDA0757F}" type="datetimeFigureOut">
               <a:rPr lang="en-US" smtClean="0"/>
-              <a:t>5/18/23</a:t>
+              <a:t>5/22/23</a:t>
             </a:fld>
             <a:endParaRPr lang="en-US"/>
           </a:p>
@@ -665,7 +665,7 @@
           <a:p>
             <a:fld id="{55F0E5CF-1040-4245-9F91-D18CDDA0757F}" type="datetimeFigureOut">
               <a:rPr lang="en-US" smtClean="0"/>
-              <a:t>5/18/23</a:t>
+              <a:t>5/22/23</a:t>
             </a:fld>
             <a:endParaRPr lang="en-US"/>
           </a:p>
@@ -863,7 +863,7 @@
           <a:p>
             <a:fld id="{55F0E5CF-1040-4245-9F91-D18CDDA0757F}" type="datetimeFigureOut">
               <a:rPr lang="en-US" smtClean="0"/>
-              <a:t>5/18/23</a:t>
+              <a:t>5/22/23</a:t>
             </a:fld>
             <a:endParaRPr lang="en-US"/>
           </a:p>
@@ -1138,7 +1138,7 @@
           <a:p>
             <a:fld id="{55F0E5CF-1040-4245-9F91-D18CDDA0757F}" type="datetimeFigureOut">
               <a:rPr lang="en-US" smtClean="0"/>
-              <a:t>5/18/23</a:t>
+              <a:t>5/22/23</a:t>
             </a:fld>
             <a:endParaRPr lang="en-US"/>
           </a:p>
@@ -1403,7 +1403,7 @@
           <a:p>
             <a:fld id="{55F0E5CF-1040-4245-9F91-D18CDDA0757F}" type="datetimeFigureOut">
               <a:rPr lang="en-US" smtClean="0"/>
-              <a:t>5/18/23</a:t>
+              <a:t>5/22/23</a:t>
             </a:fld>
             <a:endParaRPr lang="en-US"/>
           </a:p>
@@ -1815,7 +1815,7 @@
           <a:p>
             <a:fld id="{55F0E5CF-1040-4245-9F91-D18CDDA0757F}" type="datetimeFigureOut">
               <a:rPr lang="en-US" smtClean="0"/>
-              <a:t>5/18/23</a:t>
+              <a:t>5/22/23</a:t>
             </a:fld>
             <a:endParaRPr lang="en-US"/>
           </a:p>
@@ -1956,7 +1956,7 @@
           <a:p>
             <a:fld id="{55F0E5CF-1040-4245-9F91-D18CDDA0757F}" type="datetimeFigureOut">
               <a:rPr lang="en-US" smtClean="0"/>
-              <a:t>5/18/23</a:t>
+              <a:t>5/22/23</a:t>
             </a:fld>
             <a:endParaRPr lang="en-US"/>
           </a:p>
@@ -2069,7 +2069,7 @@
           <a:p>
             <a:fld id="{55F0E5CF-1040-4245-9F91-D18CDDA0757F}" type="datetimeFigureOut">
               <a:rPr lang="en-US" smtClean="0"/>
-              <a:t>5/18/23</a:t>
+              <a:t>5/22/23</a:t>
             </a:fld>
             <a:endParaRPr lang="en-US"/>
           </a:p>
@@ -2380,7 +2380,7 @@
           <a:p>
             <a:fld id="{55F0E5CF-1040-4245-9F91-D18CDDA0757F}" type="datetimeFigureOut">
               <a:rPr lang="en-US" smtClean="0"/>
-              <a:t>5/18/23</a:t>
+              <a:t>5/22/23</a:t>
             </a:fld>
             <a:endParaRPr lang="en-US"/>
           </a:p>
@@ -2668,7 +2668,7 @@
           <a:p>
             <a:fld id="{55F0E5CF-1040-4245-9F91-D18CDDA0757F}" type="datetimeFigureOut">
               <a:rPr lang="en-US" smtClean="0"/>
-              <a:t>5/18/23</a:t>
+              <a:t>5/22/23</a:t>
             </a:fld>
             <a:endParaRPr lang="en-US"/>
           </a:p>
@@ -2909,7 +2909,7 @@
           <a:p>
             <a:fld id="{55F0E5CF-1040-4245-9F91-D18CDDA0757F}" type="datetimeFigureOut">
               <a:rPr lang="en-US" smtClean="0"/>
-              <a:t>5/18/23</a:t>
+              <a:t>5/22/23</a:t>
             </a:fld>
             <a:endParaRPr lang="en-US"/>
           </a:p>
@@ -3411,7 +3411,7 @@
         </p:nvSpPr>
         <p:spPr>
           <a:xfrm>
-            <a:off x="2508283" y="2588193"/>
+            <a:off x="2508283" y="2606822"/>
             <a:ext cx="2108215" cy="1180713"/>
           </a:xfrm>
           <a:prstGeom prst="rect">
@@ -3496,7 +3496,7 @@
         </p:blipFill>
         <p:spPr>
           <a:xfrm>
-            <a:off x="2505075" y="3393941"/>
+            <a:off x="2505075" y="3412570"/>
             <a:ext cx="381000" cy="381000"/>
           </a:xfrm>
           <a:prstGeom prst="rect">
@@ -3838,7 +3838,7 @@
         </p:nvSpPr>
         <p:spPr>
           <a:xfrm>
-            <a:off x="2839239" y="3449188"/>
+            <a:off x="2839239" y="3467817"/>
             <a:ext cx="1323754" cy="276999"/>
           </a:xfrm>
           <a:prstGeom prst="rect">
@@ -4344,8 +4344,8 @@
         </p:nvSpPr>
         <p:spPr>
           <a:xfrm>
-            <a:off x="4762347" y="323524"/>
-            <a:ext cx="2187552" cy="3622900"/>
+            <a:off x="4762347" y="307372"/>
+            <a:ext cx="2187552" cy="3639052"/>
           </a:xfrm>
           <a:prstGeom prst="rect">
             <a:avLst/>
@@ -4392,7 +4392,7 @@
                 <a:latin typeface="Arial" panose="020B0604020202020204" pitchFamily="34" charset="0"/>
                 <a:cs typeface="Arial" panose="020B0604020202020204" pitchFamily="34" charset="0"/>
               </a:rPr>
-              <a:t>Availability Zone 1</a:t>
+              <a:t>Availability Zone 2</a:t>
             </a:r>
           </a:p>
         </p:txBody>
@@ -4711,8 +4711,8 @@
         </p:nvSpPr>
         <p:spPr>
           <a:xfrm>
-            <a:off x="7056413" y="323523"/>
-            <a:ext cx="2187552" cy="3639051"/>
+            <a:off x="7056413" y="307373"/>
+            <a:ext cx="2187552" cy="3655202"/>
           </a:xfrm>
           <a:prstGeom prst="rect">
             <a:avLst/>
@@ -4759,7 +4759,7 @@
                 <a:latin typeface="Arial" panose="020B0604020202020204" pitchFamily="34" charset="0"/>
                 <a:cs typeface="Arial" panose="020B0604020202020204" pitchFamily="34" charset="0"/>
               </a:rPr>
-              <a:t>Availability Zone 1</a:t>
+              <a:t>Availability Zone 3</a:t>
             </a:r>
           </a:p>
         </p:txBody>
@@ -4825,8 +4825,8 @@
         </p:nvCxnSpPr>
         <p:spPr>
           <a:xfrm rot="5400000" flipH="1" flipV="1">
-            <a:off x="4453665" y="1185635"/>
-            <a:ext cx="511285" cy="2293832"/>
+            <a:off x="4444350" y="1194949"/>
+            <a:ext cx="529914" cy="2293832"/>
           </a:xfrm>
           <a:prstGeom prst="bentConnector3">
             <a:avLst/>
@@ -4931,7 +4931,7 @@
           </a:xfrm>
           <a:prstGeom prst="bentConnector3">
             <a:avLst>
-              <a:gd name="adj1" fmla="val 52195"/>
+              <a:gd name="adj1" fmla="val 50478"/>
             </a:avLst>
           </a:prstGeom>
           <a:solidFill>

</xml_diff>